<commit_message>
update script for 11-16-2020
</commit_message>
<xml_diff>
--- a/Presentations/11-16-2020/Creepiness Metric and LSTM.pptx
+++ b/Presentations/11-16-2020/Creepiness Metric and LSTM.pptx
@@ -4,6 +4,9 @@
   <p:sldMasterIdLst>
     <p:sldMasterId id="2147483696" r:id="rId1"/>
   </p:sldMasterIdLst>
+  <p:notesMasterIdLst>
+    <p:notesMasterId r:id="rId14"/>
+  </p:notesMasterIdLst>
   <p:sldIdLst>
     <p:sldId id="256" r:id="rId2"/>
     <p:sldId id="258" r:id="rId3"/>
@@ -11,11 +14,12 @@
     <p:sldId id="261" r:id="rId5"/>
     <p:sldId id="262" r:id="rId6"/>
     <p:sldId id="259" r:id="rId7"/>
-    <p:sldId id="263" r:id="rId8"/>
-    <p:sldId id="264" r:id="rId9"/>
-    <p:sldId id="265" r:id="rId10"/>
-    <p:sldId id="266" r:id="rId11"/>
-    <p:sldId id="257" r:id="rId12"/>
+    <p:sldId id="265" r:id="rId8"/>
+    <p:sldId id="263" r:id="rId9"/>
+    <p:sldId id="266" r:id="rId10"/>
+    <p:sldId id="264" r:id="rId11"/>
+    <p:sldId id="267" r:id="rId12"/>
+    <p:sldId id="257" r:id="rId13"/>
   </p:sldIdLst>
   <p:sldSz cx="12192000" cy="6858000"/>
   <p:notesSz cx="6858000" cy="9144000"/>
@@ -114,7 +118,361 @@
       </a:defRPr>
     </a:lvl9pPr>
   </p:defaultTextStyle>
+  <p:extLst>
+    <p:ext uri="{EFAFB233-063F-42B5-8137-9DF3F51BA10A}">
+      <p15:sldGuideLst xmlns:p15="http://schemas.microsoft.com/office/powerpoint/2012/main"/>
+    </p:ext>
+  </p:extLst>
 </p:presentation>
+</file>
+
+<file path=ppt/notesMasters/notesMaster1.xml><?xml version="1.0" encoding="utf-8"?>
+<p:notesMaster xmlns:a="http://schemas.openxmlformats.org/drawingml/2006/main" xmlns:r="http://schemas.openxmlformats.org/officeDocument/2006/relationships" xmlns:p="http://schemas.openxmlformats.org/presentationml/2006/main">
+  <p:cSld>
+    <p:bg>
+      <p:bgRef idx="1001">
+        <a:schemeClr val="bg1"/>
+      </p:bgRef>
+    </p:bg>
+    <p:spTree>
+      <p:nvGrpSpPr>
+        <p:cNvPr id="1" name=""/>
+        <p:cNvGrpSpPr/>
+        <p:nvPr/>
+      </p:nvGrpSpPr>
+      <p:grpSpPr>
+        <a:xfrm>
+          <a:off x="0" y="0"/>
+          <a:ext cx="0" cy="0"/>
+          <a:chOff x="0" y="0"/>
+          <a:chExt cx="0" cy="0"/>
+        </a:xfrm>
+      </p:grpSpPr>
+      <p:sp>
+        <p:nvSpPr>
+          <p:cNvPr id="2" name="Header Placeholder 1"/>
+          <p:cNvSpPr>
+            <a:spLocks noGrp="1"/>
+          </p:cNvSpPr>
+          <p:nvPr>
+            <p:ph type="hdr" sz="quarter"/>
+          </p:nvPr>
+        </p:nvSpPr>
+        <p:spPr>
+          <a:xfrm>
+            <a:off x="0" y="0"/>
+            <a:ext cx="2971800" cy="458788"/>
+          </a:xfrm>
+          <a:prstGeom prst="rect">
+            <a:avLst/>
+          </a:prstGeom>
+        </p:spPr>
+        <p:txBody>
+          <a:bodyPr vert="horz" lIns="91440" tIns="45720" rIns="91440" bIns="45720" rtlCol="0"/>
+          <a:lstStyle>
+            <a:lvl1pPr algn="l">
+              <a:defRPr sz="1200"/>
+            </a:lvl1pPr>
+          </a:lstStyle>
+          <a:p>
+            <a:endParaRPr lang="en-US"/>
+          </a:p>
+        </p:txBody>
+      </p:sp>
+      <p:sp>
+        <p:nvSpPr>
+          <p:cNvPr id="3" name="Date Placeholder 2"/>
+          <p:cNvSpPr>
+            <a:spLocks noGrp="1"/>
+          </p:cNvSpPr>
+          <p:nvPr>
+            <p:ph type="dt" idx="1"/>
+          </p:nvPr>
+        </p:nvSpPr>
+        <p:spPr>
+          <a:xfrm>
+            <a:off x="3884613" y="0"/>
+            <a:ext cx="2971800" cy="458788"/>
+          </a:xfrm>
+          <a:prstGeom prst="rect">
+            <a:avLst/>
+          </a:prstGeom>
+        </p:spPr>
+        <p:txBody>
+          <a:bodyPr vert="horz" lIns="91440" tIns="45720" rIns="91440" bIns="45720" rtlCol="0"/>
+          <a:lstStyle>
+            <a:lvl1pPr algn="r">
+              <a:defRPr sz="1200"/>
+            </a:lvl1pPr>
+          </a:lstStyle>
+          <a:p>
+            <a:fld id="{D92669FD-F787-BA4B-8491-9D5521732D68}" type="datetimeFigureOut">
+              <a:rPr lang="en-US" smtClean="0"/>
+              <a:t>11/15/20</a:t>
+            </a:fld>
+            <a:endParaRPr lang="en-US"/>
+          </a:p>
+        </p:txBody>
+      </p:sp>
+      <p:sp>
+        <p:nvSpPr>
+          <p:cNvPr id="4" name="Slide Image Placeholder 3"/>
+          <p:cNvSpPr>
+            <a:spLocks noGrp="1" noRot="1" noChangeAspect="1"/>
+          </p:cNvSpPr>
+          <p:nvPr>
+            <p:ph type="sldImg" idx="2"/>
+          </p:nvPr>
+        </p:nvSpPr>
+        <p:spPr>
+          <a:xfrm>
+            <a:off x="685800" y="1143000"/>
+            <a:ext cx="5486400" cy="3086100"/>
+          </a:xfrm>
+          <a:prstGeom prst="rect">
+            <a:avLst/>
+          </a:prstGeom>
+          <a:noFill/>
+          <a:ln w="12700">
+            <a:solidFill>
+              <a:prstClr val="black"/>
+            </a:solidFill>
+          </a:ln>
+        </p:spPr>
+        <p:txBody>
+          <a:bodyPr vert="horz" lIns="91440" tIns="45720" rIns="91440" bIns="45720" rtlCol="0" anchor="ctr"/>
+          <a:lstStyle/>
+          <a:p>
+            <a:endParaRPr lang="en-US"/>
+          </a:p>
+        </p:txBody>
+      </p:sp>
+      <p:sp>
+        <p:nvSpPr>
+          <p:cNvPr id="5" name="Notes Placeholder 4"/>
+          <p:cNvSpPr>
+            <a:spLocks noGrp="1"/>
+          </p:cNvSpPr>
+          <p:nvPr>
+            <p:ph type="body" sz="quarter" idx="3"/>
+          </p:nvPr>
+        </p:nvSpPr>
+        <p:spPr>
+          <a:xfrm>
+            <a:off x="685800" y="4400550"/>
+            <a:ext cx="5486400" cy="3600450"/>
+          </a:xfrm>
+          <a:prstGeom prst="rect">
+            <a:avLst/>
+          </a:prstGeom>
+        </p:spPr>
+        <p:txBody>
+          <a:bodyPr vert="horz" lIns="91440" tIns="45720" rIns="91440" bIns="45720" rtlCol="0"/>
+          <a:lstStyle/>
+          <a:p>
+            <a:pPr lvl="0"/>
+            <a:r>
+              <a:rPr lang="en-US"/>
+              <a:t>Click to edit Master text styles</a:t>
+            </a:r>
+          </a:p>
+          <a:p>
+            <a:pPr lvl="1"/>
+            <a:r>
+              <a:rPr lang="en-US"/>
+              <a:t>Second level</a:t>
+            </a:r>
+          </a:p>
+          <a:p>
+            <a:pPr lvl="2"/>
+            <a:r>
+              <a:rPr lang="en-US"/>
+              <a:t>Third level</a:t>
+            </a:r>
+          </a:p>
+          <a:p>
+            <a:pPr lvl="3"/>
+            <a:r>
+              <a:rPr lang="en-US"/>
+              <a:t>Fourth level</a:t>
+            </a:r>
+          </a:p>
+          <a:p>
+            <a:pPr lvl="4"/>
+            <a:r>
+              <a:rPr lang="en-US"/>
+              <a:t>Fifth level</a:t>
+            </a:r>
+          </a:p>
+        </p:txBody>
+      </p:sp>
+      <p:sp>
+        <p:nvSpPr>
+          <p:cNvPr id="6" name="Footer Placeholder 5"/>
+          <p:cNvSpPr>
+            <a:spLocks noGrp="1"/>
+          </p:cNvSpPr>
+          <p:nvPr>
+            <p:ph type="ftr" sz="quarter" idx="4"/>
+          </p:nvPr>
+        </p:nvSpPr>
+        <p:spPr>
+          <a:xfrm>
+            <a:off x="0" y="8685213"/>
+            <a:ext cx="2971800" cy="458787"/>
+          </a:xfrm>
+          <a:prstGeom prst="rect">
+            <a:avLst/>
+          </a:prstGeom>
+        </p:spPr>
+        <p:txBody>
+          <a:bodyPr vert="horz" lIns="91440" tIns="45720" rIns="91440" bIns="45720" rtlCol="0" anchor="b"/>
+          <a:lstStyle>
+            <a:lvl1pPr algn="l">
+              <a:defRPr sz="1200"/>
+            </a:lvl1pPr>
+          </a:lstStyle>
+          <a:p>
+            <a:endParaRPr lang="en-US"/>
+          </a:p>
+        </p:txBody>
+      </p:sp>
+      <p:sp>
+        <p:nvSpPr>
+          <p:cNvPr id="7" name="Slide Number Placeholder 6"/>
+          <p:cNvSpPr>
+            <a:spLocks noGrp="1"/>
+          </p:cNvSpPr>
+          <p:nvPr>
+            <p:ph type="sldNum" sz="quarter" idx="5"/>
+          </p:nvPr>
+        </p:nvSpPr>
+        <p:spPr>
+          <a:xfrm>
+            <a:off x="3884613" y="8685213"/>
+            <a:ext cx="2971800" cy="458787"/>
+          </a:xfrm>
+          <a:prstGeom prst="rect">
+            <a:avLst/>
+          </a:prstGeom>
+        </p:spPr>
+        <p:txBody>
+          <a:bodyPr vert="horz" lIns="91440" tIns="45720" rIns="91440" bIns="45720" rtlCol="0" anchor="b"/>
+          <a:lstStyle>
+            <a:lvl1pPr algn="r">
+              <a:defRPr sz="1200"/>
+            </a:lvl1pPr>
+          </a:lstStyle>
+          <a:p>
+            <a:fld id="{B671FFD2-52C9-BA4B-81FB-3DC09515603A}" type="slidenum">
+              <a:rPr lang="en-US" smtClean="0"/>
+              <a:t>‹#›</a:t>
+            </a:fld>
+            <a:endParaRPr lang="en-US"/>
+          </a:p>
+        </p:txBody>
+      </p:sp>
+    </p:spTree>
+    <p:extLst>
+      <p:ext uri="{BB962C8B-B14F-4D97-AF65-F5344CB8AC3E}">
+        <p14:creationId xmlns:p14="http://schemas.microsoft.com/office/powerpoint/2010/main" val="3675490049"/>
+      </p:ext>
+    </p:extLst>
+  </p:cSld>
+  <p:clrMap bg1="lt1" tx1="dk1" bg2="lt2" tx2="dk2" accent1="accent1" accent2="accent2" accent3="accent3" accent4="accent4" accent5="accent5" accent6="accent6" hlink="hlink" folHlink="folHlink"/>
+  <p:notesStyle>
+    <a:lvl1pPr marL="0" algn="l" defTabSz="914400" rtl="0" eaLnBrk="1" latinLnBrk="0" hangingPunct="1">
+      <a:defRPr sz="1200" kern="1200">
+        <a:solidFill>
+          <a:schemeClr val="tx1"/>
+        </a:solidFill>
+        <a:latin typeface="+mn-lt"/>
+        <a:ea typeface="+mn-ea"/>
+        <a:cs typeface="+mn-cs"/>
+      </a:defRPr>
+    </a:lvl1pPr>
+    <a:lvl2pPr marL="457200" algn="l" defTabSz="914400" rtl="0" eaLnBrk="1" latinLnBrk="0" hangingPunct="1">
+      <a:defRPr sz="1200" kern="1200">
+        <a:solidFill>
+          <a:schemeClr val="tx1"/>
+        </a:solidFill>
+        <a:latin typeface="+mn-lt"/>
+        <a:ea typeface="+mn-ea"/>
+        <a:cs typeface="+mn-cs"/>
+      </a:defRPr>
+    </a:lvl2pPr>
+    <a:lvl3pPr marL="914400" algn="l" defTabSz="914400" rtl="0" eaLnBrk="1" latinLnBrk="0" hangingPunct="1">
+      <a:defRPr sz="1200" kern="1200">
+        <a:solidFill>
+          <a:schemeClr val="tx1"/>
+        </a:solidFill>
+        <a:latin typeface="+mn-lt"/>
+        <a:ea typeface="+mn-ea"/>
+        <a:cs typeface="+mn-cs"/>
+      </a:defRPr>
+    </a:lvl3pPr>
+    <a:lvl4pPr marL="1371600" algn="l" defTabSz="914400" rtl="0" eaLnBrk="1" latinLnBrk="0" hangingPunct="1">
+      <a:defRPr sz="1200" kern="1200">
+        <a:solidFill>
+          <a:schemeClr val="tx1"/>
+        </a:solidFill>
+        <a:latin typeface="+mn-lt"/>
+        <a:ea typeface="+mn-ea"/>
+        <a:cs typeface="+mn-cs"/>
+      </a:defRPr>
+    </a:lvl4pPr>
+    <a:lvl5pPr marL="1828800" algn="l" defTabSz="914400" rtl="0" eaLnBrk="1" latinLnBrk="0" hangingPunct="1">
+      <a:defRPr sz="1200" kern="1200">
+        <a:solidFill>
+          <a:schemeClr val="tx1"/>
+        </a:solidFill>
+        <a:latin typeface="+mn-lt"/>
+        <a:ea typeface="+mn-ea"/>
+        <a:cs typeface="+mn-cs"/>
+      </a:defRPr>
+    </a:lvl5pPr>
+    <a:lvl6pPr marL="2286000" algn="l" defTabSz="914400" rtl="0" eaLnBrk="1" latinLnBrk="0" hangingPunct="1">
+      <a:defRPr sz="1200" kern="1200">
+        <a:solidFill>
+          <a:schemeClr val="tx1"/>
+        </a:solidFill>
+        <a:latin typeface="+mn-lt"/>
+        <a:ea typeface="+mn-ea"/>
+        <a:cs typeface="+mn-cs"/>
+      </a:defRPr>
+    </a:lvl6pPr>
+    <a:lvl7pPr marL="2743200" algn="l" defTabSz="914400" rtl="0" eaLnBrk="1" latinLnBrk="0" hangingPunct="1">
+      <a:defRPr sz="1200" kern="1200">
+        <a:solidFill>
+          <a:schemeClr val="tx1"/>
+        </a:solidFill>
+        <a:latin typeface="+mn-lt"/>
+        <a:ea typeface="+mn-ea"/>
+        <a:cs typeface="+mn-cs"/>
+      </a:defRPr>
+    </a:lvl7pPr>
+    <a:lvl8pPr marL="3200400" algn="l" defTabSz="914400" rtl="0" eaLnBrk="1" latinLnBrk="0" hangingPunct="1">
+      <a:defRPr sz="1200" kern="1200">
+        <a:solidFill>
+          <a:schemeClr val="tx1"/>
+        </a:solidFill>
+        <a:latin typeface="+mn-lt"/>
+        <a:ea typeface="+mn-ea"/>
+        <a:cs typeface="+mn-cs"/>
+      </a:defRPr>
+    </a:lvl8pPr>
+    <a:lvl9pPr marL="3657600" algn="l" defTabSz="914400" rtl="0" eaLnBrk="1" latinLnBrk="0" hangingPunct="1">
+      <a:defRPr sz="1200" kern="1200">
+        <a:solidFill>
+          <a:schemeClr val="tx1"/>
+        </a:solidFill>
+        <a:latin typeface="+mn-lt"/>
+        <a:ea typeface="+mn-ea"/>
+        <a:cs typeface="+mn-cs"/>
+      </a:defRPr>
+    </a:lvl9pPr>
+  </p:notesStyle>
+</p:notesMaster>
 </file>
 
 <file path=ppt/slideLayouts/slideLayout1.xml><?xml version="1.0" encoding="utf-8"?>
@@ -280,7 +638,7 @@
           <a:p>
             <a:fld id="{1160EA64-D806-43AC-9DF2-F8C432F32B4C}" type="datetimeFigureOut">
               <a:rPr lang="en-US" dirty="0"/>
-              <a:t>11/15/2020</a:t>
+              <a:t>11/15/20</a:t>
             </a:fld>
             <a:endParaRPr lang="en-US" dirty="0"/>
           </a:p>
@@ -446,7 +804,7 @@
           <a:p>
             <a:fld id="{E9F9C37B-1D36-470B-8223-D6C91242EC14}" type="datetimeFigureOut">
               <a:rPr lang="en-US" dirty="0"/>
-              <a:t>11/15/2020</a:t>
+              <a:t>11/15/20</a:t>
             </a:fld>
             <a:endParaRPr lang="en-US" dirty="0"/>
           </a:p>
@@ -621,7 +979,7 @@
           <a:p>
             <a:fld id="{67C6F52A-A82B-47A2-A83A-8C4C91F2D59F}" type="datetimeFigureOut">
               <a:rPr lang="en-US" dirty="0"/>
-              <a:t>11/15/2020</a:t>
+              <a:t>11/15/20</a:t>
             </a:fld>
             <a:endParaRPr lang="en-US" dirty="0"/>
           </a:p>
@@ -786,7 +1144,7 @@
           <a:p>
             <a:fld id="{F070A7B3-6521-4DCA-87E5-044747A908C1}" type="datetimeFigureOut">
               <a:rPr lang="en-US" dirty="0"/>
-              <a:t>11/15/2020</a:t>
+              <a:t>11/15/20</a:t>
             </a:fld>
             <a:endParaRPr lang="en-US" dirty="0"/>
           </a:p>
@@ -1050,7 +1408,7 @@
           <a:p>
             <a:fld id="{1160EA64-D806-43AC-9DF2-F8C432F32B4C}" type="datetimeFigureOut">
               <a:rPr lang="en-US" dirty="0"/>
-              <a:t>11/15/2020</a:t>
+              <a:t>11/15/20</a:t>
             </a:fld>
             <a:endParaRPr lang="en-US" dirty="0"/>
           </a:p>
@@ -1278,7 +1636,7 @@
           <a:p>
             <a:fld id="{AB134690-1557-4C89-A502-4959FE7FAD70}" type="datetimeFigureOut">
               <a:rPr lang="en-US" dirty="0"/>
-              <a:t>11/15/2020</a:t>
+              <a:t>11/15/20</a:t>
             </a:fld>
             <a:endParaRPr lang="en-US" dirty="0"/>
           </a:p>
@@ -1632,7 +1990,7 @@
           <a:p>
             <a:fld id="{4F7D4976-E339-4826-83B7-FBD03F55ECF8}" type="datetimeFigureOut">
               <a:rPr lang="en-US" dirty="0"/>
-              <a:t>11/15/2020</a:t>
+              <a:t>11/15/20</a:t>
             </a:fld>
             <a:endParaRPr lang="en-US" dirty="0"/>
           </a:p>
@@ -1768,7 +2126,7 @@
           <a:p>
             <a:fld id="{E1037C31-9E7A-4F99-8774-A0E530DE1A42}" type="datetimeFigureOut">
               <a:rPr lang="en-US" dirty="0"/>
-              <a:t>11/15/2020</a:t>
+              <a:t>11/15/20</a:t>
             </a:fld>
             <a:endParaRPr lang="en-US" dirty="0"/>
           </a:p>
@@ -1858,7 +2216,7 @@
           <a:p>
             <a:fld id="{C278504F-A551-4DE0-9316-4DCD1D8CC752}" type="datetimeFigureOut">
               <a:rPr lang="en-US" dirty="0"/>
-              <a:t>11/15/2020</a:t>
+              <a:t>11/15/20</a:t>
             </a:fld>
             <a:endParaRPr lang="en-US" dirty="0"/>
           </a:p>
@@ -2210,7 +2568,7 @@
           <a:p>
             <a:fld id="{D1BE4249-C0D0-4B06-8692-E8BB871AF643}" type="datetimeFigureOut">
               <a:rPr lang="en-US" dirty="0"/>
-              <a:t>11/15/2020</a:t>
+              <a:t>11/15/20</a:t>
             </a:fld>
             <a:endParaRPr lang="en-US" dirty="0"/>
           </a:p>
@@ -2562,7 +2920,7 @@
           <a:p>
             <a:fld id="{042B0DB6-F5C7-45FB-8CF3-31B45F9C2DAC}" type="datetimeFigureOut">
               <a:rPr lang="en-US" dirty="0"/>
-              <a:t>11/15/2020</a:t>
+              <a:t>11/15/20</a:t>
             </a:fld>
             <a:endParaRPr lang="en-US" dirty="0"/>
           </a:p>
@@ -2799,7 +3157,7 @@
           <a:p>
             <a:fld id="{1160EA64-D806-43AC-9DF2-F8C432F32B4C}" type="datetimeFigureOut">
               <a:rPr lang="en-US" dirty="0"/>
-              <a:t>11/15/2020</a:t>
+              <a:t>11/15/20</a:t>
             </a:fld>
             <a:endParaRPr lang="en-US" dirty="0"/>
           </a:p>
@@ -3370,10 +3728,10 @@
       </p:sp>
       <p:pic>
         <p:nvPicPr>
-          <p:cNvPr id="3074" name="Picture 2" descr="[animate output image]">
+          <p:cNvPr id="2056" name="Picture 8" descr="[animate output image]">
             <a:extLst>
               <a:ext uri="{FF2B5EF4-FFF2-40B4-BE49-F238E27FC236}">
-                <a16:creationId xmlns:a16="http://schemas.microsoft.com/office/drawing/2014/main" id="{BE5DB840-3B3D-4A5E-8EC1-448DF6C48A72}"/>
+                <a16:creationId xmlns:a16="http://schemas.microsoft.com/office/drawing/2014/main" id="{59C0E7CD-9D2D-4E98-BDA3-82AE0F1DFFA6}"/>
               </a:ext>
             </a:extLst>
           </p:cNvPr>
@@ -3397,8 +3755,8 @@
         </p:blipFill>
         <p:spPr bwMode="auto">
           <a:xfrm>
-            <a:off x="2973284" y="2032329"/>
-            <a:ext cx="6245432" cy="4163621"/>
+            <a:off x="1838053" y="2222986"/>
+            <a:ext cx="5713062" cy="3808708"/>
           </a:xfrm>
           <a:prstGeom prst="rect">
             <a:avLst/>
@@ -3415,10 +3773,59 @@
           </a:extLst>
         </p:spPr>
       </p:pic>
+      <p:sp>
+        <p:nvSpPr>
+          <p:cNvPr id="4" name="TextBox 3">
+            <a:extLst>
+              <a:ext uri="{FF2B5EF4-FFF2-40B4-BE49-F238E27FC236}">
+                <a16:creationId xmlns:a16="http://schemas.microsoft.com/office/drawing/2014/main" id="{D239F4F8-118B-4948-981C-CC47B3AA1CF9}"/>
+              </a:ext>
+            </a:extLst>
+          </p:cNvPr>
+          <p:cNvSpPr txBox="1"/>
+          <p:nvPr/>
+        </p:nvSpPr>
+        <p:spPr>
+          <a:xfrm>
+            <a:off x="7693738" y="2817226"/>
+            <a:ext cx="3480365" cy="1200329"/>
+          </a:xfrm>
+          <a:prstGeom prst="rect">
+            <a:avLst/>
+          </a:prstGeom>
+          <a:noFill/>
+        </p:spPr>
+        <p:txBody>
+          <a:bodyPr wrap="square" rtlCol="0">
+            <a:spAutoFit/>
+          </a:bodyPr>
+          <a:lstStyle/>
+          <a:p>
+            <a:r>
+              <a:rPr lang="en-US" dirty="0"/>
+              <a:t>A story from </a:t>
+            </a:r>
+            <a:r>
+              <a:rPr lang="en-US" dirty="0" err="1"/>
+              <a:t>nosleep</a:t>
+            </a:r>
+            <a:r>
+              <a:rPr lang="en-US" dirty="0"/>
+              <a:t> with 303 sentences</a:t>
+            </a:r>
+          </a:p>
+          <a:p>
+            <a:r>
+              <a:rPr lang="en-US" dirty="0"/>
+              <a:t>The most upvoted story in the dataset</a:t>
+            </a:r>
+          </a:p>
+        </p:txBody>
+      </p:sp>
     </p:spTree>
     <p:extLst>
       <p:ext uri="{BB962C8B-B14F-4D97-AF65-F5344CB8AC3E}">
-        <p14:creationId xmlns:p14="http://schemas.microsoft.com/office/powerpoint/2010/main" val="3304003674"/>
+        <p14:creationId xmlns:p14="http://schemas.microsoft.com/office/powerpoint/2010/main" val="1875282661"/>
       </p:ext>
     </p:extLst>
   </p:cSld>
@@ -3429,6 +3836,145 @@
 </file>
 
 <file path=ppt/slides/slide11.xml><?xml version="1.0" encoding="utf-8"?>
+<p:sld xmlns:a="http://schemas.openxmlformats.org/drawingml/2006/main" xmlns:r="http://schemas.openxmlformats.org/officeDocument/2006/relationships" xmlns:p="http://schemas.openxmlformats.org/presentationml/2006/main">
+  <p:cSld>
+    <p:bg>
+      <p:bgPr>
+        <a:solidFill>
+          <a:schemeClr val="bg1">
+            <a:lumMod val="95000"/>
+          </a:schemeClr>
+        </a:solidFill>
+        <a:effectLst/>
+      </p:bgPr>
+    </p:bg>
+    <p:spTree>
+      <p:nvGrpSpPr>
+        <p:cNvPr id="1" name=""/>
+        <p:cNvGrpSpPr/>
+        <p:nvPr/>
+      </p:nvGrpSpPr>
+      <p:grpSpPr>
+        <a:xfrm>
+          <a:off x="0" y="0"/>
+          <a:ext cx="0" cy="0"/>
+          <a:chOff x="0" y="0"/>
+          <a:chExt cx="0" cy="0"/>
+        </a:xfrm>
+      </p:grpSpPr>
+      <p:pic>
+        <p:nvPicPr>
+          <p:cNvPr id="5" name="Picture 4" descr="A picture containing diagram&#10;&#10;Description automatically generated">
+            <a:extLst>
+              <a:ext uri="{FF2B5EF4-FFF2-40B4-BE49-F238E27FC236}">
+                <a16:creationId xmlns:a16="http://schemas.microsoft.com/office/drawing/2014/main" id="{8E3984C4-7B9D-4457-BB4C-CF263D4F573A}"/>
+              </a:ext>
+            </a:extLst>
+          </p:cNvPr>
+          <p:cNvPicPr>
+            <a:picLocks noChangeAspect="1"/>
+          </p:cNvPicPr>
+          <p:nvPr/>
+        </p:nvPicPr>
+        <p:blipFill rotWithShape="1">
+          <a:blip r:embed="rId2"/>
+          <a:srcRect r="10786" b="-1"/>
+          <a:stretch/>
+        </p:blipFill>
+        <p:spPr>
+          <a:xfrm>
+            <a:off x="804334" y="804334"/>
+            <a:ext cx="10583332" cy="5249332"/>
+          </a:xfrm>
+          <a:prstGeom prst="rect">
+            <a:avLst/>
+          </a:prstGeom>
+        </p:spPr>
+      </p:pic>
+      <p:sp>
+        <p:nvSpPr>
+          <p:cNvPr id="2" name="TextBox 1">
+            <a:extLst>
+              <a:ext uri="{FF2B5EF4-FFF2-40B4-BE49-F238E27FC236}">
+                <a16:creationId xmlns:a16="http://schemas.microsoft.com/office/drawing/2014/main" id="{642766C4-4488-D34F-A80C-1D8506FC031E}"/>
+              </a:ext>
+            </a:extLst>
+          </p:cNvPr>
+          <p:cNvSpPr txBox="1"/>
+          <p:nvPr/>
+        </p:nvSpPr>
+        <p:spPr>
+          <a:xfrm>
+            <a:off x="3657600" y="5078896"/>
+            <a:ext cx="2007704" cy="276999"/>
+          </a:xfrm>
+          <a:prstGeom prst="rect">
+            <a:avLst/>
+          </a:prstGeom>
+          <a:noFill/>
+        </p:spPr>
+        <p:txBody>
+          <a:bodyPr wrap="square" rtlCol="0">
+            <a:spAutoFit/>
+          </a:bodyPr>
+          <a:lstStyle/>
+          <a:p>
+            <a:r>
+              <a:rPr lang="en-US" sz="1200" dirty="0"/>
+              <a:t>Or average all LSTM vectors</a:t>
+            </a:r>
+          </a:p>
+        </p:txBody>
+      </p:sp>
+      <p:sp>
+        <p:nvSpPr>
+          <p:cNvPr id="4" name="TextBox 3">
+            <a:extLst>
+              <a:ext uri="{FF2B5EF4-FFF2-40B4-BE49-F238E27FC236}">
+                <a16:creationId xmlns:a16="http://schemas.microsoft.com/office/drawing/2014/main" id="{87E3772B-7306-6640-BDF9-4B2E87FE09DA}"/>
+              </a:ext>
+            </a:extLst>
+          </p:cNvPr>
+          <p:cNvSpPr txBox="1"/>
+          <p:nvPr/>
+        </p:nvSpPr>
+        <p:spPr>
+          <a:xfrm>
+            <a:off x="8348869" y="5068957"/>
+            <a:ext cx="2007704" cy="276999"/>
+          </a:xfrm>
+          <a:prstGeom prst="rect">
+            <a:avLst/>
+          </a:prstGeom>
+          <a:noFill/>
+        </p:spPr>
+        <p:txBody>
+          <a:bodyPr wrap="square" rtlCol="0">
+            <a:spAutoFit/>
+          </a:bodyPr>
+          <a:lstStyle/>
+          <a:p>
+            <a:r>
+              <a:rPr lang="en-US" sz="1200" dirty="0"/>
+              <a:t>Or average all LSTM vectors</a:t>
+            </a:r>
+          </a:p>
+        </p:txBody>
+      </p:sp>
+    </p:spTree>
+    <p:extLst>
+      <p:ext uri="{BB962C8B-B14F-4D97-AF65-F5344CB8AC3E}">
+        <p14:creationId xmlns:p14="http://schemas.microsoft.com/office/powerpoint/2010/main" val="1825979284"/>
+      </p:ext>
+    </p:extLst>
+  </p:cSld>
+  <p:clrMapOvr>
+    <a:masterClrMapping/>
+  </p:clrMapOvr>
+</p:sld>
+</file>
+
+<file path=ppt/slides/slide12.xml><?xml version="1.0" encoding="utf-8"?>
 <p:sld xmlns:a="http://schemas.openxmlformats.org/drawingml/2006/main" xmlns:r="http://schemas.openxmlformats.org/officeDocument/2006/relationships" xmlns:p="http://schemas.openxmlformats.org/presentationml/2006/main">
   <p:cSld>
     <p:spTree>
@@ -3502,8 +4048,12 @@
           <a:p>
             <a:pPr lvl="1"/>
             <a:r>
+              <a:rPr lang="en-US"/>
+              <a:t>I have 16G </a:t>
+            </a:r>
+            <a:r>
               <a:rPr lang="en-US" dirty="0"/>
-              <a:t>16G of RAM and 8G of  VRAM</a:t>
+              <a:t>of RAM and 8G of  VRAM</a:t>
             </a:r>
           </a:p>
         </p:txBody>
@@ -3677,6 +4227,76 @@
           </a:prstGeom>
         </p:spPr>
       </p:pic>
+      <p:sp>
+        <p:nvSpPr>
+          <p:cNvPr id="2" name="TextBox 1">
+            <a:extLst>
+              <a:ext uri="{FF2B5EF4-FFF2-40B4-BE49-F238E27FC236}">
+                <a16:creationId xmlns:a16="http://schemas.microsoft.com/office/drawing/2014/main" id="{642766C4-4488-D34F-A80C-1D8506FC031E}"/>
+              </a:ext>
+            </a:extLst>
+          </p:cNvPr>
+          <p:cNvSpPr txBox="1"/>
+          <p:nvPr/>
+        </p:nvSpPr>
+        <p:spPr>
+          <a:xfrm>
+            <a:off x="3657600" y="5078896"/>
+            <a:ext cx="2007704" cy="276999"/>
+          </a:xfrm>
+          <a:prstGeom prst="rect">
+            <a:avLst/>
+          </a:prstGeom>
+          <a:noFill/>
+        </p:spPr>
+        <p:txBody>
+          <a:bodyPr wrap="square" rtlCol="0">
+            <a:spAutoFit/>
+          </a:bodyPr>
+          <a:lstStyle/>
+          <a:p>
+            <a:r>
+              <a:rPr lang="en-US" sz="1200" dirty="0"/>
+              <a:t>Or average all LSTM vectors</a:t>
+            </a:r>
+          </a:p>
+        </p:txBody>
+      </p:sp>
+      <p:sp>
+        <p:nvSpPr>
+          <p:cNvPr id="4" name="TextBox 3">
+            <a:extLst>
+              <a:ext uri="{FF2B5EF4-FFF2-40B4-BE49-F238E27FC236}">
+                <a16:creationId xmlns:a16="http://schemas.microsoft.com/office/drawing/2014/main" id="{87E3772B-7306-6640-BDF9-4B2E87FE09DA}"/>
+              </a:ext>
+            </a:extLst>
+          </p:cNvPr>
+          <p:cNvSpPr txBox="1"/>
+          <p:nvPr/>
+        </p:nvSpPr>
+        <p:spPr>
+          <a:xfrm>
+            <a:off x="8348869" y="5068957"/>
+            <a:ext cx="2007704" cy="276999"/>
+          </a:xfrm>
+          <a:prstGeom prst="rect">
+            <a:avLst/>
+          </a:prstGeom>
+          <a:noFill/>
+        </p:spPr>
+        <p:txBody>
+          <a:bodyPr wrap="square" rtlCol="0">
+            <a:spAutoFit/>
+          </a:bodyPr>
+          <a:lstStyle/>
+          <a:p>
+            <a:r>
+              <a:rPr lang="en-US" sz="1200" dirty="0"/>
+              <a:t>Or average all LSTM vectors</a:t>
+            </a:r>
+          </a:p>
+        </p:txBody>
+      </p:sp>
     </p:spTree>
     <p:extLst>
       <p:ext uri="{BB962C8B-B14F-4D97-AF65-F5344CB8AC3E}">
@@ -3751,9 +4371,16 @@
             <p:ph idx="1"/>
           </p:nvPr>
         </p:nvSpPr>
-        <p:spPr/>
-        <p:txBody>
-          <a:bodyPr/>
+        <p:spPr>
+          <a:xfrm>
+            <a:off x="2231136" y="2638044"/>
+            <a:ext cx="7729728" cy="3882026"/>
+          </a:xfrm>
+        </p:spPr>
+        <p:txBody>
+          <a:bodyPr>
+            <a:normAutofit fontScale="92500" lnSpcReduction="10000"/>
+          </a:bodyPr>
           <a:lstStyle/>
           <a:p>
             <a:r>
@@ -3768,8 +4395,27 @@
           <a:p>
             <a:pPr lvl="1"/>
             <a:r>
-              <a:rPr lang="de-DE" dirty="0"/>
+              <a:rPr lang="de-DE" dirty="0">
+                <a:hlinkClick r:id="rId2"/>
+              </a:rPr>
               <a:t>https://www.pnas.org/content/114/38/E7900</a:t>
+            </a:r>
+            <a:endParaRPr lang="de-DE" dirty="0"/>
+          </a:p>
+          <a:p>
+            <a:pPr lvl="1"/>
+            <a:r>
+              <a:rPr lang="de-DE" dirty="0">
+                <a:hlinkClick r:id="rId3"/>
+              </a:rPr>
+              <a:t>https://s3-us-west-1.amazonaws.com/emogifs/map.html#</a:t>
+            </a:r>
+            <a:endParaRPr lang="de-DE" dirty="0"/>
+          </a:p>
+          <a:p>
+            <a:r>
+              <a:rPr lang="en-US" dirty="0"/>
+              <a:t>Their results were discovered after gathered 2,185 short videos showing a wide variety of situations and events, including a man with a spider in his mouth, a cat giving a dog a massage and an awkward handshake. The videos were chosen to provoke particular emotions from more than 800 participating viewers.</a:t>
             </a:r>
           </a:p>
           <a:p>
@@ -4190,6 +4836,152 @@
           <a:p>
             <a:r>
               <a:rPr lang="en-US" dirty="0"/>
+              <a:t>A story from confessions with 24 sentences</a:t>
+            </a:r>
+          </a:p>
+          <a:p>
+            <a:r>
+              <a:rPr lang="en-US" dirty="0"/>
+              <a:t>The most upvoted story in the dataset</a:t>
+            </a:r>
+          </a:p>
+        </p:txBody>
+      </p:sp>
+      <p:pic>
+        <p:nvPicPr>
+          <p:cNvPr id="4098" name="Picture 2">
+            <a:extLst>
+              <a:ext uri="{FF2B5EF4-FFF2-40B4-BE49-F238E27FC236}">
+                <a16:creationId xmlns:a16="http://schemas.microsoft.com/office/drawing/2014/main" id="{14C603B9-7981-4D05-A893-455E843519A1}"/>
+              </a:ext>
+            </a:extLst>
+          </p:cNvPr>
+          <p:cNvPicPr>
+            <a:picLocks noChangeAspect="1" noChangeArrowheads="1"/>
+          </p:cNvPicPr>
+          <p:nvPr/>
+        </p:nvPicPr>
+        <p:blipFill>
+          <a:blip r:embed="rId2">
+            <a:extLst>
+              <a:ext uri="{28A0092B-C50C-407E-A947-70E740481C1C}">
+                <a14:useLocalDpi xmlns:a14="http://schemas.microsoft.com/office/drawing/2010/main" val="0"/>
+              </a:ext>
+            </a:extLst>
+          </a:blip>
+          <a:srcRect/>
+          <a:stretch>
+            <a:fillRect/>
+          </a:stretch>
+        </p:blipFill>
+        <p:spPr bwMode="auto">
+          <a:xfrm>
+            <a:off x="823688" y="2386739"/>
+            <a:ext cx="6084626" cy="4035068"/>
+          </a:xfrm>
+          <a:prstGeom prst="rect">
+            <a:avLst/>
+          </a:prstGeom>
+          <a:noFill/>
+          <a:extLst>
+            <a:ext uri="{909E8E84-426E-40DD-AFC4-6F175D3DCCD1}">
+              <a14:hiddenFill xmlns:a14="http://schemas.microsoft.com/office/drawing/2010/main">
+                <a:solidFill>
+                  <a:srgbClr val="FFFFFF"/>
+                </a:solidFill>
+              </a14:hiddenFill>
+            </a:ext>
+          </a:extLst>
+        </p:spPr>
+      </p:pic>
+    </p:spTree>
+    <p:extLst>
+      <p:ext uri="{BB962C8B-B14F-4D97-AF65-F5344CB8AC3E}">
+        <p14:creationId xmlns:p14="http://schemas.microsoft.com/office/powerpoint/2010/main" val="2015612702"/>
+      </p:ext>
+    </p:extLst>
+  </p:cSld>
+  <p:clrMapOvr>
+    <a:masterClrMapping/>
+  </p:clrMapOvr>
+</p:sld>
+</file>
+
+<file path=ppt/slides/slide8.xml><?xml version="1.0" encoding="utf-8"?>
+<p:sld xmlns:a="http://schemas.openxmlformats.org/drawingml/2006/main" xmlns:r="http://schemas.openxmlformats.org/officeDocument/2006/relationships" xmlns:p="http://schemas.openxmlformats.org/presentationml/2006/main">
+  <p:cSld>
+    <p:spTree>
+      <p:nvGrpSpPr>
+        <p:cNvPr id="1" name=""/>
+        <p:cNvGrpSpPr/>
+        <p:nvPr/>
+      </p:nvGrpSpPr>
+      <p:grpSpPr>
+        <a:xfrm>
+          <a:off x="0" y="0"/>
+          <a:ext cx="0" cy="0"/>
+          <a:chOff x="0" y="0"/>
+          <a:chExt cx="0" cy="0"/>
+        </a:xfrm>
+      </p:grpSpPr>
+      <p:sp>
+        <p:nvSpPr>
+          <p:cNvPr id="2" name="Title 1">
+            <a:extLst>
+              <a:ext uri="{FF2B5EF4-FFF2-40B4-BE49-F238E27FC236}">
+                <a16:creationId xmlns:a16="http://schemas.microsoft.com/office/drawing/2014/main" id="{840C72AC-2CA2-4FCB-B6F4-5922AFAA3DBD}"/>
+              </a:ext>
+            </a:extLst>
+          </p:cNvPr>
+          <p:cNvSpPr>
+            <a:spLocks noGrp="1"/>
+          </p:cNvSpPr>
+          <p:nvPr>
+            <p:ph type="title"/>
+          </p:nvPr>
+        </p:nvSpPr>
+        <p:spPr/>
+        <p:txBody>
+          <a:bodyPr/>
+          <a:lstStyle/>
+          <a:p>
+            <a:r>
+              <a:rPr lang="en-US" dirty="0"/>
+              <a:t>Horror level across a story</a:t>
+            </a:r>
+          </a:p>
+        </p:txBody>
+      </p:sp>
+      <p:sp>
+        <p:nvSpPr>
+          <p:cNvPr id="4" name="TextBox 3">
+            <a:extLst>
+              <a:ext uri="{FF2B5EF4-FFF2-40B4-BE49-F238E27FC236}">
+                <a16:creationId xmlns:a16="http://schemas.microsoft.com/office/drawing/2014/main" id="{F8F16410-44C9-4BDC-A624-421087228011}"/>
+              </a:ext>
+            </a:extLst>
+          </p:cNvPr>
+          <p:cNvSpPr txBox="1"/>
+          <p:nvPr/>
+        </p:nvSpPr>
+        <p:spPr>
+          <a:xfrm>
+            <a:off x="7693738" y="2817226"/>
+            <a:ext cx="3480365" cy="1200329"/>
+          </a:xfrm>
+          <a:prstGeom prst="rect">
+            <a:avLst/>
+          </a:prstGeom>
+          <a:noFill/>
+        </p:spPr>
+        <p:txBody>
+          <a:bodyPr wrap="square" rtlCol="0">
+            <a:spAutoFit/>
+          </a:bodyPr>
+          <a:lstStyle/>
+          <a:p>
+            <a:r>
+              <a:rPr lang="en-US" dirty="0"/>
               <a:t>A story from </a:t>
             </a:r>
             <a:r>
@@ -4269,7 +5061,7 @@
 </p:sld>
 </file>
 
-<file path=ppt/slides/slide8.xml><?xml version="1.0" encoding="utf-8"?>
+<file path=ppt/slides/slide9.xml><?xml version="1.0" encoding="utf-8"?>
 <p:sld xmlns:a="http://schemas.openxmlformats.org/drawingml/2006/main" xmlns:r="http://schemas.openxmlformats.org/officeDocument/2006/relationships" xmlns:p="http://schemas.openxmlformats.org/presentationml/2006/main">
   <p:cSld>
     <p:spTree>
@@ -4316,10 +5108,10 @@
       </p:sp>
       <p:pic>
         <p:nvPicPr>
-          <p:cNvPr id="2056" name="Picture 8" descr="[animate output image]">
+          <p:cNvPr id="3074" name="Picture 2" descr="[animate output image]">
             <a:extLst>
               <a:ext uri="{FF2B5EF4-FFF2-40B4-BE49-F238E27FC236}">
-                <a16:creationId xmlns:a16="http://schemas.microsoft.com/office/drawing/2014/main" id="{59C0E7CD-9D2D-4E98-BDA3-82AE0F1DFFA6}"/>
+                <a16:creationId xmlns:a16="http://schemas.microsoft.com/office/drawing/2014/main" id="{BE5DB840-3B3D-4A5E-8EC1-448DF6C48A72}"/>
               </a:ext>
             </a:extLst>
           </p:cNvPr>
@@ -4343,8 +5135,8 @@
         </p:blipFill>
         <p:spPr bwMode="auto">
           <a:xfrm>
-            <a:off x="3239469" y="2153412"/>
-            <a:ext cx="5713062" cy="3808708"/>
+            <a:off x="1283632" y="2012451"/>
+            <a:ext cx="6245432" cy="4163621"/>
           </a:xfrm>
           <a:prstGeom prst="rect">
             <a:avLst/>
@@ -4361,70 +5153,12 @@
           </a:extLst>
         </p:spPr>
       </p:pic>
-    </p:spTree>
-    <p:extLst>
-      <p:ext uri="{BB962C8B-B14F-4D97-AF65-F5344CB8AC3E}">
-        <p14:creationId xmlns:p14="http://schemas.microsoft.com/office/powerpoint/2010/main" val="1875282661"/>
-      </p:ext>
-    </p:extLst>
-  </p:cSld>
-  <p:clrMapOvr>
-    <a:masterClrMapping/>
-  </p:clrMapOvr>
-</p:sld>
-</file>
-
-<file path=ppt/slides/slide9.xml><?xml version="1.0" encoding="utf-8"?>
-<p:sld xmlns:a="http://schemas.openxmlformats.org/drawingml/2006/main" xmlns:r="http://schemas.openxmlformats.org/officeDocument/2006/relationships" xmlns:p="http://schemas.openxmlformats.org/presentationml/2006/main">
-  <p:cSld>
-    <p:spTree>
-      <p:nvGrpSpPr>
-        <p:cNvPr id="1" name=""/>
-        <p:cNvGrpSpPr/>
-        <p:nvPr/>
-      </p:nvGrpSpPr>
-      <p:grpSpPr>
-        <a:xfrm>
-          <a:off x="0" y="0"/>
-          <a:ext cx="0" cy="0"/>
-          <a:chOff x="0" y="0"/>
-          <a:chExt cx="0" cy="0"/>
-        </a:xfrm>
-      </p:grpSpPr>
-      <p:sp>
-        <p:nvSpPr>
-          <p:cNvPr id="2" name="Title 1">
-            <a:extLst>
-              <a:ext uri="{FF2B5EF4-FFF2-40B4-BE49-F238E27FC236}">
-                <a16:creationId xmlns:a16="http://schemas.microsoft.com/office/drawing/2014/main" id="{840C72AC-2CA2-4FCB-B6F4-5922AFAA3DBD}"/>
-              </a:ext>
-            </a:extLst>
-          </p:cNvPr>
-          <p:cNvSpPr>
-            <a:spLocks noGrp="1"/>
-          </p:cNvSpPr>
-          <p:nvPr>
-            <p:ph type="title"/>
-          </p:nvPr>
-        </p:nvSpPr>
-        <p:spPr/>
-        <p:txBody>
-          <a:bodyPr/>
-          <a:lstStyle/>
-          <a:p>
-            <a:r>
-              <a:rPr lang="en-US" dirty="0"/>
-              <a:t>Horror level across a story</a:t>
-            </a:r>
-          </a:p>
-        </p:txBody>
-      </p:sp>
       <p:sp>
         <p:nvSpPr>
           <p:cNvPr id="4" name="TextBox 3">
             <a:extLst>
               <a:ext uri="{FF2B5EF4-FFF2-40B4-BE49-F238E27FC236}">
-                <a16:creationId xmlns:a16="http://schemas.microsoft.com/office/drawing/2014/main" id="{F8F16410-44C9-4BDC-A624-421087228011}"/>
+                <a16:creationId xmlns:a16="http://schemas.microsoft.com/office/drawing/2014/main" id="{D558BA89-BF00-FC43-8355-1909EC80DB83}"/>
               </a:ext>
             </a:extLst>
           </p:cNvPr>
@@ -4460,57 +5194,10 @@
           </a:p>
         </p:txBody>
       </p:sp>
-      <p:pic>
-        <p:nvPicPr>
-          <p:cNvPr id="4098" name="Picture 2">
-            <a:extLst>
-              <a:ext uri="{FF2B5EF4-FFF2-40B4-BE49-F238E27FC236}">
-                <a16:creationId xmlns:a16="http://schemas.microsoft.com/office/drawing/2014/main" id="{14C603B9-7981-4D05-A893-455E843519A1}"/>
-              </a:ext>
-            </a:extLst>
-          </p:cNvPr>
-          <p:cNvPicPr>
-            <a:picLocks noChangeAspect="1" noChangeArrowheads="1"/>
-          </p:cNvPicPr>
-          <p:nvPr/>
-        </p:nvPicPr>
-        <p:blipFill>
-          <a:blip r:embed="rId2">
-            <a:extLst>
-              <a:ext uri="{28A0092B-C50C-407E-A947-70E740481C1C}">
-                <a14:useLocalDpi xmlns:a14="http://schemas.microsoft.com/office/drawing/2010/main" val="0"/>
-              </a:ext>
-            </a:extLst>
-          </a:blip>
-          <a:srcRect/>
-          <a:stretch>
-            <a:fillRect/>
-          </a:stretch>
-        </p:blipFill>
-        <p:spPr bwMode="auto">
-          <a:xfrm>
-            <a:off x="823688" y="2386739"/>
-            <a:ext cx="6084626" cy="4035068"/>
-          </a:xfrm>
-          <a:prstGeom prst="rect">
-            <a:avLst/>
-          </a:prstGeom>
-          <a:noFill/>
-          <a:extLst>
-            <a:ext uri="{909E8E84-426E-40DD-AFC4-6F175D3DCCD1}">
-              <a14:hiddenFill xmlns:a14="http://schemas.microsoft.com/office/drawing/2010/main">
-                <a:solidFill>
-                  <a:srgbClr val="FFFFFF"/>
-                </a:solidFill>
-              </a14:hiddenFill>
-            </a:ext>
-          </a:extLst>
-        </p:spPr>
-      </p:pic>
     </p:spTree>
     <p:extLst>
       <p:ext uri="{BB962C8B-B14F-4D97-AF65-F5344CB8AC3E}">
-        <p14:creationId xmlns:p14="http://schemas.microsoft.com/office/powerpoint/2010/main" val="2015612702"/>
+        <p14:creationId xmlns:p14="http://schemas.microsoft.com/office/powerpoint/2010/main" val="3304003674"/>
       </p:ext>
     </p:extLst>
   </p:cSld>
@@ -4778,4 +5465,299 @@
     </a:ext>
   </a:extLst>
 </a:theme>
+</file>
+
+<file path=ppt/theme/theme2.xml><?xml version="1.0" encoding="utf-8"?>
+<a:theme xmlns:a="http://schemas.openxmlformats.org/drawingml/2006/main" name="Office Theme">
+  <a:themeElements>
+    <a:clrScheme name="Office">
+      <a:dk1>
+        <a:sysClr val="windowText" lastClr="000000"/>
+      </a:dk1>
+      <a:lt1>
+        <a:sysClr val="window" lastClr="FFFFFF"/>
+      </a:lt1>
+      <a:dk2>
+        <a:srgbClr val="44546A"/>
+      </a:dk2>
+      <a:lt2>
+        <a:srgbClr val="E7E6E6"/>
+      </a:lt2>
+      <a:accent1>
+        <a:srgbClr val="4472C4"/>
+      </a:accent1>
+      <a:accent2>
+        <a:srgbClr val="ED7D31"/>
+      </a:accent2>
+      <a:accent3>
+        <a:srgbClr val="A5A5A5"/>
+      </a:accent3>
+      <a:accent4>
+        <a:srgbClr val="FFC000"/>
+      </a:accent4>
+      <a:accent5>
+        <a:srgbClr val="5B9BD5"/>
+      </a:accent5>
+      <a:accent6>
+        <a:srgbClr val="70AD47"/>
+      </a:accent6>
+      <a:hlink>
+        <a:srgbClr val="0563C1"/>
+      </a:hlink>
+      <a:folHlink>
+        <a:srgbClr val="954F72"/>
+      </a:folHlink>
+    </a:clrScheme>
+    <a:fontScheme name="Office">
+      <a:majorFont>
+        <a:latin typeface="Calibri Light" panose="020F0302020204030204"/>
+        <a:ea typeface=""/>
+        <a:cs typeface=""/>
+        <a:font script="Jpan" typeface="游ゴシック Light"/>
+        <a:font script="Hang" typeface="맑은 고딕"/>
+        <a:font script="Hans" typeface="等线 Light"/>
+        <a:font script="Hant" typeface="新細明體"/>
+        <a:font script="Arab" typeface="Times New Roman"/>
+        <a:font script="Hebr" typeface="Times New Roman"/>
+        <a:font script="Thai" typeface="Angsana New"/>
+        <a:font script="Ethi" typeface="Nyala"/>
+        <a:font script="Beng" typeface="Vrinda"/>
+        <a:font script="Gujr" typeface="Shruti"/>
+        <a:font script="Khmr" typeface="MoolBoran"/>
+        <a:font script="Knda" typeface="Tunga"/>
+        <a:font script="Guru" typeface="Raavi"/>
+        <a:font script="Cans" typeface="Euphemia"/>
+        <a:font script="Cher" typeface="Plantagenet Cherokee"/>
+        <a:font script="Yiii" typeface="Microsoft Yi Baiti"/>
+        <a:font script="Tibt" typeface="Microsoft Himalaya"/>
+        <a:font script="Thaa" typeface="MV Boli"/>
+        <a:font script="Deva" typeface="Mangal"/>
+        <a:font script="Telu" typeface="Gautami"/>
+        <a:font script="Taml" typeface="Latha"/>
+        <a:font script="Syrc" typeface="Estrangelo Edessa"/>
+        <a:font script="Orya" typeface="Kalinga"/>
+        <a:font script="Mlym" typeface="Kartika"/>
+        <a:font script="Laoo" typeface="DokChampa"/>
+        <a:font script="Sinh" typeface="Iskoola Pota"/>
+        <a:font script="Mong" typeface="Mongolian Baiti"/>
+        <a:font script="Viet" typeface="Times New Roman"/>
+        <a:font script="Uigh" typeface="Microsoft Uighur"/>
+        <a:font script="Geor" typeface="Sylfaen"/>
+        <a:font script="Armn" typeface="Arial"/>
+        <a:font script="Bugi" typeface="Leelawadee UI"/>
+        <a:font script="Bopo" typeface="Microsoft JhengHei"/>
+        <a:font script="Java" typeface="Javanese Text"/>
+        <a:font script="Lisu" typeface="Segoe UI"/>
+        <a:font script="Mymr" typeface="Myanmar Text"/>
+        <a:font script="Nkoo" typeface="Ebrima"/>
+        <a:font script="Olck" typeface="Nirmala UI"/>
+        <a:font script="Osma" typeface="Ebrima"/>
+        <a:font script="Phag" typeface="Phagspa"/>
+        <a:font script="Syrn" typeface="Estrangelo Edessa"/>
+        <a:font script="Syrj" typeface="Estrangelo Edessa"/>
+        <a:font script="Syre" typeface="Estrangelo Edessa"/>
+        <a:font script="Sora" typeface="Nirmala UI"/>
+        <a:font script="Tale" typeface="Microsoft Tai Le"/>
+        <a:font script="Talu" typeface="Microsoft New Tai Lue"/>
+        <a:font script="Tfng" typeface="Ebrima"/>
+      </a:majorFont>
+      <a:minorFont>
+        <a:latin typeface="Calibri" panose="020F0502020204030204"/>
+        <a:ea typeface=""/>
+        <a:cs typeface=""/>
+        <a:font script="Jpan" typeface="游ゴシック"/>
+        <a:font script="Hang" typeface="맑은 고딕"/>
+        <a:font script="Hans" typeface="等线"/>
+        <a:font script="Hant" typeface="新細明體"/>
+        <a:font script="Arab" typeface="Arial"/>
+        <a:font script="Hebr" typeface="Arial"/>
+        <a:font script="Thai" typeface="Cordia New"/>
+        <a:font script="Ethi" typeface="Nyala"/>
+        <a:font script="Beng" typeface="Vrinda"/>
+        <a:font script="Gujr" typeface="Shruti"/>
+        <a:font script="Khmr" typeface="DaunPenh"/>
+        <a:font script="Knda" typeface="Tunga"/>
+        <a:font script="Guru" typeface="Raavi"/>
+        <a:font script="Cans" typeface="Euphemia"/>
+        <a:font script="Cher" typeface="Plantagenet Cherokee"/>
+        <a:font script="Yiii" typeface="Microsoft Yi Baiti"/>
+        <a:font script="Tibt" typeface="Microsoft Himalaya"/>
+        <a:font script="Thaa" typeface="MV Boli"/>
+        <a:font script="Deva" typeface="Mangal"/>
+        <a:font script="Telu" typeface="Gautami"/>
+        <a:font script="Taml" typeface="Latha"/>
+        <a:font script="Syrc" typeface="Estrangelo Edessa"/>
+        <a:font script="Orya" typeface="Kalinga"/>
+        <a:font script="Mlym" typeface="Kartika"/>
+        <a:font script="Laoo" typeface="DokChampa"/>
+        <a:font script="Sinh" typeface="Iskoola Pota"/>
+        <a:font script="Mong" typeface="Mongolian Baiti"/>
+        <a:font script="Viet" typeface="Arial"/>
+        <a:font script="Uigh" typeface="Microsoft Uighur"/>
+        <a:font script="Geor" typeface="Sylfaen"/>
+        <a:font script="Armn" typeface="Arial"/>
+        <a:font script="Bugi" typeface="Leelawadee UI"/>
+        <a:font script="Bopo" typeface="Microsoft JhengHei"/>
+        <a:font script="Java" typeface="Javanese Text"/>
+        <a:font script="Lisu" typeface="Segoe UI"/>
+        <a:font script="Mymr" typeface="Myanmar Text"/>
+        <a:font script="Nkoo" typeface="Ebrima"/>
+        <a:font script="Olck" typeface="Nirmala UI"/>
+        <a:font script="Osma" typeface="Ebrima"/>
+        <a:font script="Phag" typeface="Phagspa"/>
+        <a:font script="Syrn" typeface="Estrangelo Edessa"/>
+        <a:font script="Syrj" typeface="Estrangelo Edessa"/>
+        <a:font script="Syre" typeface="Estrangelo Edessa"/>
+        <a:font script="Sora" typeface="Nirmala UI"/>
+        <a:font script="Tale" typeface="Microsoft Tai Le"/>
+        <a:font script="Talu" typeface="Microsoft New Tai Lue"/>
+        <a:font script="Tfng" typeface="Ebrima"/>
+      </a:minorFont>
+    </a:fontScheme>
+    <a:fmtScheme name="Office">
+      <a:fillStyleLst>
+        <a:solidFill>
+          <a:schemeClr val="phClr"/>
+        </a:solidFill>
+        <a:gradFill rotWithShape="1">
+          <a:gsLst>
+            <a:gs pos="0">
+              <a:schemeClr val="phClr">
+                <a:lumMod val="110000"/>
+                <a:satMod val="105000"/>
+                <a:tint val="67000"/>
+              </a:schemeClr>
+            </a:gs>
+            <a:gs pos="50000">
+              <a:schemeClr val="phClr">
+                <a:lumMod val="105000"/>
+                <a:satMod val="103000"/>
+                <a:tint val="73000"/>
+              </a:schemeClr>
+            </a:gs>
+            <a:gs pos="100000">
+              <a:schemeClr val="phClr">
+                <a:lumMod val="105000"/>
+                <a:satMod val="109000"/>
+                <a:tint val="81000"/>
+              </a:schemeClr>
+            </a:gs>
+          </a:gsLst>
+          <a:lin ang="5400000" scaled="0"/>
+        </a:gradFill>
+        <a:gradFill rotWithShape="1">
+          <a:gsLst>
+            <a:gs pos="0">
+              <a:schemeClr val="phClr">
+                <a:satMod val="103000"/>
+                <a:lumMod val="102000"/>
+                <a:tint val="94000"/>
+              </a:schemeClr>
+            </a:gs>
+            <a:gs pos="50000">
+              <a:schemeClr val="phClr">
+                <a:satMod val="110000"/>
+                <a:lumMod val="100000"/>
+                <a:shade val="100000"/>
+              </a:schemeClr>
+            </a:gs>
+            <a:gs pos="100000">
+              <a:schemeClr val="phClr">
+                <a:lumMod val="99000"/>
+                <a:satMod val="120000"/>
+                <a:shade val="78000"/>
+              </a:schemeClr>
+            </a:gs>
+          </a:gsLst>
+          <a:lin ang="5400000" scaled="0"/>
+        </a:gradFill>
+      </a:fillStyleLst>
+      <a:lnStyleLst>
+        <a:ln w="6350" cap="flat" cmpd="sng" algn="ctr">
+          <a:solidFill>
+            <a:schemeClr val="phClr"/>
+          </a:solidFill>
+          <a:prstDash val="solid"/>
+          <a:miter lim="800000"/>
+        </a:ln>
+        <a:ln w="12700" cap="flat" cmpd="sng" algn="ctr">
+          <a:solidFill>
+            <a:schemeClr val="phClr"/>
+          </a:solidFill>
+          <a:prstDash val="solid"/>
+          <a:miter lim="800000"/>
+        </a:ln>
+        <a:ln w="19050" cap="flat" cmpd="sng" algn="ctr">
+          <a:solidFill>
+            <a:schemeClr val="phClr"/>
+          </a:solidFill>
+          <a:prstDash val="solid"/>
+          <a:miter lim="800000"/>
+        </a:ln>
+      </a:lnStyleLst>
+      <a:effectStyleLst>
+        <a:effectStyle>
+          <a:effectLst/>
+        </a:effectStyle>
+        <a:effectStyle>
+          <a:effectLst/>
+        </a:effectStyle>
+        <a:effectStyle>
+          <a:effectLst>
+            <a:outerShdw blurRad="57150" dist="19050" dir="5400000" algn="ctr" rotWithShape="0">
+              <a:srgbClr val="000000">
+                <a:alpha val="63000"/>
+              </a:srgbClr>
+            </a:outerShdw>
+          </a:effectLst>
+        </a:effectStyle>
+      </a:effectStyleLst>
+      <a:bgFillStyleLst>
+        <a:solidFill>
+          <a:schemeClr val="phClr"/>
+        </a:solidFill>
+        <a:solidFill>
+          <a:schemeClr val="phClr">
+            <a:tint val="95000"/>
+            <a:satMod val="170000"/>
+          </a:schemeClr>
+        </a:solidFill>
+        <a:gradFill rotWithShape="1">
+          <a:gsLst>
+            <a:gs pos="0">
+              <a:schemeClr val="phClr">
+                <a:tint val="93000"/>
+                <a:satMod val="150000"/>
+                <a:shade val="98000"/>
+                <a:lumMod val="102000"/>
+              </a:schemeClr>
+            </a:gs>
+            <a:gs pos="50000">
+              <a:schemeClr val="phClr">
+                <a:tint val="98000"/>
+                <a:satMod val="130000"/>
+                <a:shade val="90000"/>
+                <a:lumMod val="103000"/>
+              </a:schemeClr>
+            </a:gs>
+            <a:gs pos="100000">
+              <a:schemeClr val="phClr">
+                <a:shade val="63000"/>
+                <a:satMod val="120000"/>
+              </a:schemeClr>
+            </a:gs>
+          </a:gsLst>
+          <a:lin ang="5400000" scaled="0"/>
+        </a:gradFill>
+      </a:bgFillStyleLst>
+    </a:fmtScheme>
+  </a:themeElements>
+  <a:objectDefaults/>
+  <a:extraClrSchemeLst/>
+  <a:extLst>
+    <a:ext uri="{05A4C25C-085E-4340-85A3-A5531E510DB2}">
+      <thm15:themeFamily xmlns:thm15="http://schemas.microsoft.com/office/thememl/2012/main" name="Office Theme" id="{62F939B6-93AF-4DB8-9C6B-D6C7DFDC589F}" vid="{4A3C46E8-61CC-4603-A589-7422A47A8E4A}"/>
+    </a:ext>
+  </a:extLst>
+</a:theme>
 </file>
</xml_diff>